<commit_message>
alle Korrekturen von Klaus eingepflegt
git-svn-id: https://diplomarbeit-thomas-fischbach.googlecode.com/svn/Diplomarbeit@69 05cedec1-86a4-2e7f-768b-0a98c8b23869
</commit_message>
<xml_diff>
--- a/misc/zeichnungen.pptx
+++ b/misc/zeichnungen.pptx
@@ -196,7 +196,7 @@
           <a:p>
             <a:fld id="{F4F03C40-80E2-48B5-AD93-42720680308F}" type="datetimeFigureOut">
               <a:rPr lang="en-US" smtClean="0"/>
-              <a:t>1/5/2012</a:t>
+              <a:t>1/29/2012</a:t>
             </a:fld>
             <a:endParaRPr lang="en-US"/>
           </a:p>
@@ -813,7 +813,7 @@
           <a:p>
             <a:fld id="{3E8D215E-9EDC-45B6-82BD-AACBA5328147}" type="datetimeFigureOut">
               <a:rPr lang="en-US" smtClean="0"/>
-              <a:t>1/5/2012</a:t>
+              <a:t>1/29/2012</a:t>
             </a:fld>
             <a:endParaRPr lang="en-US"/>
           </a:p>
@@ -983,7 +983,7 @@
           <a:p>
             <a:fld id="{3E8D215E-9EDC-45B6-82BD-AACBA5328147}" type="datetimeFigureOut">
               <a:rPr lang="en-US" smtClean="0"/>
-              <a:t>1/5/2012</a:t>
+              <a:t>1/29/2012</a:t>
             </a:fld>
             <a:endParaRPr lang="en-US"/>
           </a:p>
@@ -1163,7 +1163,7 @@
           <a:p>
             <a:fld id="{3E8D215E-9EDC-45B6-82BD-AACBA5328147}" type="datetimeFigureOut">
               <a:rPr lang="en-US" smtClean="0"/>
-              <a:t>1/5/2012</a:t>
+              <a:t>1/29/2012</a:t>
             </a:fld>
             <a:endParaRPr lang="en-US"/>
           </a:p>
@@ -1333,7 +1333,7 @@
           <a:p>
             <a:fld id="{3E8D215E-9EDC-45B6-82BD-AACBA5328147}" type="datetimeFigureOut">
               <a:rPr lang="en-US" smtClean="0"/>
-              <a:t>1/5/2012</a:t>
+              <a:t>1/29/2012</a:t>
             </a:fld>
             <a:endParaRPr lang="en-US"/>
           </a:p>
@@ -1579,7 +1579,7 @@
           <a:p>
             <a:fld id="{3E8D215E-9EDC-45B6-82BD-AACBA5328147}" type="datetimeFigureOut">
               <a:rPr lang="en-US" smtClean="0"/>
-              <a:t>1/5/2012</a:t>
+              <a:t>1/29/2012</a:t>
             </a:fld>
             <a:endParaRPr lang="en-US"/>
           </a:p>
@@ -1867,7 +1867,7 @@
           <a:p>
             <a:fld id="{3E8D215E-9EDC-45B6-82BD-AACBA5328147}" type="datetimeFigureOut">
               <a:rPr lang="en-US" smtClean="0"/>
-              <a:t>1/5/2012</a:t>
+              <a:t>1/29/2012</a:t>
             </a:fld>
             <a:endParaRPr lang="en-US"/>
           </a:p>
@@ -2289,7 +2289,7 @@
           <a:p>
             <a:fld id="{3E8D215E-9EDC-45B6-82BD-AACBA5328147}" type="datetimeFigureOut">
               <a:rPr lang="en-US" smtClean="0"/>
-              <a:t>1/5/2012</a:t>
+              <a:t>1/29/2012</a:t>
             </a:fld>
             <a:endParaRPr lang="en-US"/>
           </a:p>
@@ -2407,7 +2407,7 @@
           <a:p>
             <a:fld id="{3E8D215E-9EDC-45B6-82BD-AACBA5328147}" type="datetimeFigureOut">
               <a:rPr lang="en-US" smtClean="0"/>
-              <a:t>1/5/2012</a:t>
+              <a:t>1/29/2012</a:t>
             </a:fld>
             <a:endParaRPr lang="en-US"/>
           </a:p>
@@ -2502,7 +2502,7 @@
           <a:p>
             <a:fld id="{3E8D215E-9EDC-45B6-82BD-AACBA5328147}" type="datetimeFigureOut">
               <a:rPr lang="en-US" smtClean="0"/>
-              <a:t>1/5/2012</a:t>
+              <a:t>1/29/2012</a:t>
             </a:fld>
             <a:endParaRPr lang="en-US"/>
           </a:p>
@@ -2779,7 +2779,7 @@
           <a:p>
             <a:fld id="{3E8D215E-9EDC-45B6-82BD-AACBA5328147}" type="datetimeFigureOut">
               <a:rPr lang="en-US" smtClean="0"/>
-              <a:t>1/5/2012</a:t>
+              <a:t>1/29/2012</a:t>
             </a:fld>
             <a:endParaRPr lang="en-US"/>
           </a:p>
@@ -3032,7 +3032,7 @@
           <a:p>
             <a:fld id="{3E8D215E-9EDC-45B6-82BD-AACBA5328147}" type="datetimeFigureOut">
               <a:rPr lang="en-US" smtClean="0"/>
-              <a:t>1/5/2012</a:t>
+              <a:t>1/29/2012</a:t>
             </a:fld>
             <a:endParaRPr lang="en-US"/>
           </a:p>
@@ -3245,7 +3245,7 @@
           <a:p>
             <a:fld id="{3E8D215E-9EDC-45B6-82BD-AACBA5328147}" type="datetimeFigureOut">
               <a:rPr lang="en-US" smtClean="0"/>
-              <a:t>1/5/2012</a:t>
+              <a:t>1/29/2012</a:t>
             </a:fld>
             <a:endParaRPr lang="en-US"/>
           </a:p>
@@ -4867,7 +4867,7 @@
         </p:nvSpPr>
         <p:spPr>
           <a:xfrm>
-            <a:off x="643179" y="5947868"/>
+            <a:off x="643179" y="5585682"/>
             <a:ext cx="544444" cy="400110"/>
           </a:xfrm>
           <a:prstGeom prst="rect">
@@ -4897,7 +4897,7 @@
         </p:nvSpPr>
         <p:spPr>
           <a:xfrm>
-            <a:off x="643179" y="5231346"/>
+            <a:off x="643179" y="4869160"/>
             <a:ext cx="544444" cy="400110"/>
           </a:xfrm>
           <a:prstGeom prst="rect">

</xml_diff>